<commit_message>
Updated readme, screenshot and template to show all available icons
</commit_message>
<xml_diff>
--- a/templates/template-powerpoint.pptx
+++ b/templates/template-powerpoint.pptx
@@ -5,8 +5,9 @@
     <p:sldMasterId id="2147483648" r:id="rId1"/>
   </p:sldMasterIdLst>
   <p:sldIdLst>
-    <p:sldId id="257" r:id="rId2"/>
-    <p:sldId id="258" r:id="rId3"/>
+    <p:sldId id="259" r:id="rId2"/>
+    <p:sldId id="257" r:id="rId3"/>
+    <p:sldId id="258" r:id="rId4"/>
   </p:sldIdLst>
   <p:sldSz cx="12192000" cy="6858000"/>
   <p:notesSz cx="6858000" cy="9144000"/>
@@ -161,7 +162,7 @@
           <a:p>
             <a:fld id="{D4D58C0E-4B6B-5F40-A2C8-B41F0781BD76}" type="datetimeFigureOut">
               <a:rPr lang="en-US" smtClean="0"/>
-              <a:t>4/26/20</a:t>
+              <a:t>2/13/21</a:t>
             </a:fld>
             <a:endParaRPr lang="en-US"/>
           </a:p>
@@ -588,6 +589,1312 @@
           <a:chExt cx="0" cy="0"/>
         </a:xfrm>
       </p:grpSpPr>
+      <p:sp>
+        <p:nvSpPr>
+          <p:cNvPr id="25" name="TextBox 24">
+            <a:extLst>
+              <a:ext uri="{FF2B5EF4-FFF2-40B4-BE49-F238E27FC236}">
+                <a16:creationId xmlns:a16="http://schemas.microsoft.com/office/drawing/2014/main" id="{7AC4169D-9040-5F4A-890A-FC524CE8D88C}"/>
+              </a:ext>
+            </a:extLst>
+          </p:cNvPr>
+          <p:cNvSpPr txBox="1"/>
+          <p:nvPr/>
+        </p:nvSpPr>
+        <p:spPr>
+          <a:xfrm>
+            <a:off x="775776" y="471931"/>
+            <a:ext cx="5282215" cy="646331"/>
+          </a:xfrm>
+          <a:prstGeom prst="rect">
+            <a:avLst/>
+          </a:prstGeom>
+          <a:noFill/>
+        </p:spPr>
+        <p:txBody>
+          <a:bodyPr wrap="none" rtlCol="0">
+            <a:spAutoFit/>
+          </a:bodyPr>
+          <a:lstStyle/>
+          <a:p>
+            <a:r>
+              <a:rPr lang="en-US" sz="3600" b="1" dirty="0"/>
+              <a:t>GOV.UK </a:t>
+            </a:r>
+            <a:r>
+              <a:rPr lang="en-US" sz="3600" b="1" dirty="0" err="1"/>
+              <a:t>Userflow</a:t>
+            </a:r>
+            <a:r>
+              <a:rPr lang="en-US" sz="3600" b="1" dirty="0"/>
+              <a:t> Icons</a:t>
+            </a:r>
+          </a:p>
+        </p:txBody>
+      </p:sp>
+      <p:sp>
+        <p:nvSpPr>
+          <p:cNvPr id="3" name="Rounded Rectangle 2">
+            <a:extLst>
+              <a:ext uri="{FF2B5EF4-FFF2-40B4-BE49-F238E27FC236}">
+                <a16:creationId xmlns:a16="http://schemas.microsoft.com/office/drawing/2014/main" id="{30A76AF3-AEDA-DF46-AB8A-4CD0ECE65D56}"/>
+              </a:ext>
+            </a:extLst>
+          </p:cNvPr>
+          <p:cNvSpPr/>
+          <p:nvPr/>
+        </p:nvSpPr>
+        <p:spPr>
+          <a:xfrm>
+            <a:off x="7733157" y="1695149"/>
+            <a:ext cx="1036349" cy="283913"/>
+          </a:xfrm>
+          <a:prstGeom prst="roundRect">
+            <a:avLst>
+              <a:gd name="adj" fmla="val 50000"/>
+            </a:avLst>
+          </a:prstGeom>
+          <a:solidFill>
+            <a:schemeClr val="bg1"/>
+          </a:solidFill>
+          <a:ln>
+            <a:noFill/>
+          </a:ln>
+        </p:spPr>
+        <p:style>
+          <a:lnRef idx="2">
+            <a:schemeClr val="accent1">
+              <a:shade val="50000"/>
+            </a:schemeClr>
+          </a:lnRef>
+          <a:fillRef idx="1">
+            <a:schemeClr val="accent1"/>
+          </a:fillRef>
+          <a:effectRef idx="0">
+            <a:schemeClr val="accent1"/>
+          </a:effectRef>
+          <a:fontRef idx="minor">
+            <a:schemeClr val="lt1"/>
+          </a:fontRef>
+        </p:style>
+        <p:txBody>
+          <a:bodyPr lIns="0" tIns="0" rIns="0" bIns="0" rtlCol="0" anchor="ctr"/>
+          <a:lstStyle/>
+          <a:p>
+            <a:pPr algn="ctr"/>
+            <a:r>
+              <a:rPr lang="en-US" sz="900" b="1" dirty="0">
+                <a:solidFill>
+                  <a:schemeClr val="tx1"/>
+                </a:solidFill>
+              </a:rPr>
+              <a:t>Check answers</a:t>
+            </a:r>
+          </a:p>
+        </p:txBody>
+      </p:sp>
+      <p:pic>
+        <p:nvPicPr>
+          <p:cNvPr id="4" name="Graphic 3">
+            <a:extLst>
+              <a:ext uri="{FF2B5EF4-FFF2-40B4-BE49-F238E27FC236}">
+                <a16:creationId xmlns:a16="http://schemas.microsoft.com/office/drawing/2014/main" id="{71E1912C-A22E-4949-88E3-4F5245562D10}"/>
+              </a:ext>
+            </a:extLst>
+          </p:cNvPr>
+          <p:cNvPicPr>
+            <a:picLocks noChangeAspect="1"/>
+          </p:cNvPicPr>
+          <p:nvPr/>
+        </p:nvPicPr>
+        <p:blipFill>
+          <a:blip r:embed="rId2">
+            <a:extLst>
+              <a:ext uri="{28A0092B-C50C-407E-A947-70E740481C1C}">
+                <a14:useLocalDpi xmlns:a14="http://schemas.microsoft.com/office/drawing/2010/main"/>
+              </a:ext>
+              <a:ext uri="{96DAC541-7B7A-43D3-8B79-37D633B846F1}">
+                <asvg:svgBlip xmlns:asvg="http://schemas.microsoft.com/office/drawing/2016/SVG/main" r:embed="rId3"/>
+              </a:ext>
+            </a:extLst>
+          </a:blip>
+          <a:stretch>
+            <a:fillRect/>
+          </a:stretch>
+        </p:blipFill>
+        <p:spPr>
+          <a:xfrm>
+            <a:off x="7793742" y="2249937"/>
+            <a:ext cx="915178" cy="1307495"/>
+          </a:xfrm>
+          <a:prstGeom prst="rect">
+            <a:avLst/>
+          </a:prstGeom>
+        </p:spPr>
+      </p:pic>
+      <p:sp>
+        <p:nvSpPr>
+          <p:cNvPr id="6" name="Rounded Rectangle 5">
+            <a:extLst>
+              <a:ext uri="{FF2B5EF4-FFF2-40B4-BE49-F238E27FC236}">
+                <a16:creationId xmlns:a16="http://schemas.microsoft.com/office/drawing/2014/main" id="{25450082-41A4-A64C-BA63-9B020282634C}"/>
+              </a:ext>
+            </a:extLst>
+          </p:cNvPr>
+          <p:cNvSpPr/>
+          <p:nvPr/>
+        </p:nvSpPr>
+        <p:spPr>
+          <a:xfrm>
+            <a:off x="10230195" y="1695149"/>
+            <a:ext cx="897125" cy="283913"/>
+          </a:xfrm>
+          <a:prstGeom prst="roundRect">
+            <a:avLst>
+              <a:gd name="adj" fmla="val 50000"/>
+            </a:avLst>
+          </a:prstGeom>
+          <a:solidFill>
+            <a:schemeClr val="bg1"/>
+          </a:solidFill>
+          <a:ln>
+            <a:noFill/>
+          </a:ln>
+        </p:spPr>
+        <p:style>
+          <a:lnRef idx="2">
+            <a:schemeClr val="accent1">
+              <a:shade val="50000"/>
+            </a:schemeClr>
+          </a:lnRef>
+          <a:fillRef idx="1">
+            <a:schemeClr val="accent1"/>
+          </a:fillRef>
+          <a:effectRef idx="0">
+            <a:schemeClr val="accent1"/>
+          </a:effectRef>
+          <a:fontRef idx="minor">
+            <a:schemeClr val="lt1"/>
+          </a:fontRef>
+        </p:style>
+        <p:txBody>
+          <a:bodyPr lIns="0" tIns="0" rIns="0" bIns="0" rtlCol="0" anchor="ctr"/>
+          <a:lstStyle/>
+          <a:p>
+            <a:pPr algn="ctr"/>
+            <a:r>
+              <a:rPr lang="en-US" sz="900" b="1" dirty="0">
+                <a:solidFill>
+                  <a:schemeClr val="tx1"/>
+                </a:solidFill>
+              </a:rPr>
+              <a:t>Confirmation</a:t>
+            </a:r>
+          </a:p>
+        </p:txBody>
+      </p:sp>
+      <p:pic>
+        <p:nvPicPr>
+          <p:cNvPr id="7" name="Graphic 6">
+            <a:extLst>
+              <a:ext uri="{FF2B5EF4-FFF2-40B4-BE49-F238E27FC236}">
+                <a16:creationId xmlns:a16="http://schemas.microsoft.com/office/drawing/2014/main" id="{D97FD5D8-A239-E946-95A3-AAA7719C769F}"/>
+              </a:ext>
+            </a:extLst>
+          </p:cNvPr>
+          <p:cNvPicPr>
+            <a:picLocks noChangeAspect="1"/>
+          </p:cNvPicPr>
+          <p:nvPr/>
+        </p:nvPicPr>
+        <p:blipFill>
+          <a:blip r:embed="rId4">
+            <a:extLst>
+              <a:ext uri="{28A0092B-C50C-407E-A947-70E740481C1C}">
+                <a14:useLocalDpi xmlns:a14="http://schemas.microsoft.com/office/drawing/2010/main"/>
+              </a:ext>
+              <a:ext uri="{96DAC541-7B7A-43D3-8B79-37D633B846F1}">
+                <asvg:svgBlip xmlns:asvg="http://schemas.microsoft.com/office/drawing/2016/SVG/main" r:embed="rId5"/>
+              </a:ext>
+            </a:extLst>
+          </a:blip>
+          <a:stretch>
+            <a:fillRect/>
+          </a:stretch>
+        </p:blipFill>
+        <p:spPr>
+          <a:xfrm>
+            <a:off x="10221168" y="2249937"/>
+            <a:ext cx="915178" cy="1307495"/>
+          </a:xfrm>
+          <a:prstGeom prst="rect">
+            <a:avLst/>
+          </a:prstGeom>
+        </p:spPr>
+      </p:pic>
+      <p:sp>
+        <p:nvSpPr>
+          <p:cNvPr id="9" name="Rounded Rectangle 8">
+            <a:extLst>
+              <a:ext uri="{FF2B5EF4-FFF2-40B4-BE49-F238E27FC236}">
+                <a16:creationId xmlns:a16="http://schemas.microsoft.com/office/drawing/2014/main" id="{1B43F2D5-213A-D049-86F2-9ED8AA885948}"/>
+              </a:ext>
+            </a:extLst>
+          </p:cNvPr>
+          <p:cNvSpPr/>
+          <p:nvPr/>
+        </p:nvSpPr>
+        <p:spPr>
+          <a:xfrm>
+            <a:off x="9036440" y="1695149"/>
+            <a:ext cx="897125" cy="283913"/>
+          </a:xfrm>
+          <a:prstGeom prst="roundRect">
+            <a:avLst>
+              <a:gd name="adj" fmla="val 50000"/>
+            </a:avLst>
+          </a:prstGeom>
+          <a:solidFill>
+            <a:schemeClr val="bg1"/>
+          </a:solidFill>
+          <a:ln>
+            <a:noFill/>
+          </a:ln>
+        </p:spPr>
+        <p:style>
+          <a:lnRef idx="2">
+            <a:schemeClr val="accent1">
+              <a:shade val="50000"/>
+            </a:schemeClr>
+          </a:lnRef>
+          <a:fillRef idx="1">
+            <a:schemeClr val="accent1"/>
+          </a:fillRef>
+          <a:effectRef idx="0">
+            <a:schemeClr val="accent1"/>
+          </a:effectRef>
+          <a:fontRef idx="minor">
+            <a:schemeClr val="lt1"/>
+          </a:fontRef>
+        </p:style>
+        <p:txBody>
+          <a:bodyPr lIns="0" tIns="0" rIns="0" bIns="0" rtlCol="0" anchor="ctr"/>
+          <a:lstStyle/>
+          <a:p>
+            <a:pPr algn="ctr"/>
+            <a:r>
+              <a:rPr lang="en-US" sz="900" b="1" dirty="0">
+                <a:solidFill>
+                  <a:schemeClr val="tx1"/>
+                </a:solidFill>
+              </a:rPr>
+              <a:t>Dashboard</a:t>
+            </a:r>
+          </a:p>
+        </p:txBody>
+      </p:sp>
+      <p:pic>
+        <p:nvPicPr>
+          <p:cNvPr id="10" name="Graphic 9">
+            <a:extLst>
+              <a:ext uri="{FF2B5EF4-FFF2-40B4-BE49-F238E27FC236}">
+                <a16:creationId xmlns:a16="http://schemas.microsoft.com/office/drawing/2014/main" id="{96E01CE2-04F0-0D46-A80C-14D72462F397}"/>
+              </a:ext>
+            </a:extLst>
+          </p:cNvPr>
+          <p:cNvPicPr>
+            <a:picLocks noChangeAspect="1"/>
+          </p:cNvPicPr>
+          <p:nvPr/>
+        </p:nvPicPr>
+        <p:blipFill>
+          <a:blip r:embed="rId6">
+            <a:extLst>
+              <a:ext uri="{28A0092B-C50C-407E-A947-70E740481C1C}">
+                <a14:useLocalDpi xmlns:a14="http://schemas.microsoft.com/office/drawing/2010/main"/>
+              </a:ext>
+              <a:ext uri="{96DAC541-7B7A-43D3-8B79-37D633B846F1}">
+                <asvg:svgBlip xmlns:asvg="http://schemas.microsoft.com/office/drawing/2016/SVG/main" r:embed="rId7"/>
+              </a:ext>
+            </a:extLst>
+          </a:blip>
+          <a:stretch>
+            <a:fillRect/>
+          </a:stretch>
+        </p:blipFill>
+        <p:spPr>
+          <a:xfrm>
+            <a:off x="9027413" y="2249937"/>
+            <a:ext cx="915178" cy="1307495"/>
+          </a:xfrm>
+          <a:prstGeom prst="rect">
+            <a:avLst/>
+          </a:prstGeom>
+        </p:spPr>
+      </p:pic>
+      <p:sp>
+        <p:nvSpPr>
+          <p:cNvPr id="12" name="Rounded Rectangle 11">
+            <a:extLst>
+              <a:ext uri="{FF2B5EF4-FFF2-40B4-BE49-F238E27FC236}">
+                <a16:creationId xmlns:a16="http://schemas.microsoft.com/office/drawing/2014/main" id="{9EDFD3AF-3E44-A34C-8FF0-31E38D610773}"/>
+              </a:ext>
+            </a:extLst>
+          </p:cNvPr>
+          <p:cNvSpPr/>
+          <p:nvPr/>
+        </p:nvSpPr>
+        <p:spPr>
+          <a:xfrm>
+            <a:off x="2123849" y="1695149"/>
+            <a:ext cx="758486" cy="283913"/>
+          </a:xfrm>
+          <a:prstGeom prst="roundRect">
+            <a:avLst>
+              <a:gd name="adj" fmla="val 50000"/>
+            </a:avLst>
+          </a:prstGeom>
+          <a:solidFill>
+            <a:schemeClr val="bg1"/>
+          </a:solidFill>
+          <a:ln>
+            <a:noFill/>
+          </a:ln>
+        </p:spPr>
+        <p:style>
+          <a:lnRef idx="2">
+            <a:schemeClr val="accent1">
+              <a:shade val="50000"/>
+            </a:schemeClr>
+          </a:lnRef>
+          <a:fillRef idx="1">
+            <a:schemeClr val="accent1"/>
+          </a:fillRef>
+          <a:effectRef idx="0">
+            <a:schemeClr val="accent1"/>
+          </a:effectRef>
+          <a:fontRef idx="minor">
+            <a:schemeClr val="lt1"/>
+          </a:fontRef>
+        </p:style>
+        <p:txBody>
+          <a:bodyPr lIns="0" tIns="0" rIns="0" bIns="0" rtlCol="0" anchor="ctr"/>
+          <a:lstStyle/>
+          <a:p>
+            <a:pPr algn="ctr"/>
+            <a:r>
+              <a:rPr lang="en-US" sz="900" b="1" dirty="0">
+                <a:solidFill>
+                  <a:schemeClr val="tx1"/>
+                </a:solidFill>
+              </a:rPr>
+              <a:t>Sign in</a:t>
+            </a:r>
+          </a:p>
+        </p:txBody>
+      </p:sp>
+      <p:pic>
+        <p:nvPicPr>
+          <p:cNvPr id="13" name="Graphic 12">
+            <a:extLst>
+              <a:ext uri="{FF2B5EF4-FFF2-40B4-BE49-F238E27FC236}">
+                <a16:creationId xmlns:a16="http://schemas.microsoft.com/office/drawing/2014/main" id="{62D4B20E-2DC8-FC4C-9DAD-72171B1BD93B}"/>
+              </a:ext>
+            </a:extLst>
+          </p:cNvPr>
+          <p:cNvPicPr>
+            <a:picLocks noChangeAspect="1"/>
+          </p:cNvPicPr>
+          <p:nvPr/>
+        </p:nvPicPr>
+        <p:blipFill>
+          <a:blip r:embed="rId8">
+            <a:extLst>
+              <a:ext uri="{28A0092B-C50C-407E-A947-70E740481C1C}">
+                <a14:useLocalDpi xmlns:a14="http://schemas.microsoft.com/office/drawing/2010/main"/>
+              </a:ext>
+              <a:ext uri="{96DAC541-7B7A-43D3-8B79-37D633B846F1}">
+                <asvg:svgBlip xmlns:asvg="http://schemas.microsoft.com/office/drawing/2016/SVG/main" r:embed="rId9"/>
+              </a:ext>
+            </a:extLst>
+          </a:blip>
+          <a:stretch>
+            <a:fillRect/>
+          </a:stretch>
+        </p:blipFill>
+        <p:spPr>
+          <a:xfrm>
+            <a:off x="2045503" y="2249937"/>
+            <a:ext cx="915178" cy="1307495"/>
+          </a:xfrm>
+          <a:prstGeom prst="rect">
+            <a:avLst/>
+          </a:prstGeom>
+        </p:spPr>
+      </p:pic>
+      <p:sp>
+        <p:nvSpPr>
+          <p:cNvPr id="15" name="Rounded Rectangle 14">
+            <a:extLst>
+              <a:ext uri="{FF2B5EF4-FFF2-40B4-BE49-F238E27FC236}">
+                <a16:creationId xmlns:a16="http://schemas.microsoft.com/office/drawing/2014/main" id="{B988AD69-334A-D848-ACD0-E3C3FC7C557F}"/>
+              </a:ext>
+            </a:extLst>
+          </p:cNvPr>
+          <p:cNvSpPr/>
+          <p:nvPr/>
+        </p:nvSpPr>
+        <p:spPr>
+          <a:xfrm>
+            <a:off x="964939" y="1695149"/>
+            <a:ext cx="758486" cy="283913"/>
+          </a:xfrm>
+          <a:prstGeom prst="roundRect">
+            <a:avLst>
+              <a:gd name="adj" fmla="val 50000"/>
+            </a:avLst>
+          </a:prstGeom>
+          <a:solidFill>
+            <a:schemeClr val="bg1"/>
+          </a:solidFill>
+          <a:ln>
+            <a:noFill/>
+          </a:ln>
+        </p:spPr>
+        <p:style>
+          <a:lnRef idx="2">
+            <a:schemeClr val="accent1">
+              <a:shade val="50000"/>
+            </a:schemeClr>
+          </a:lnRef>
+          <a:fillRef idx="1">
+            <a:schemeClr val="accent1"/>
+          </a:fillRef>
+          <a:effectRef idx="0">
+            <a:schemeClr val="accent1"/>
+          </a:effectRef>
+          <a:fontRef idx="minor">
+            <a:schemeClr val="lt1"/>
+          </a:fontRef>
+        </p:style>
+        <p:txBody>
+          <a:bodyPr lIns="0" tIns="0" rIns="0" bIns="0" rtlCol="0" anchor="ctr"/>
+          <a:lstStyle/>
+          <a:p>
+            <a:pPr algn="ctr"/>
+            <a:r>
+              <a:rPr lang="en-US" sz="900" b="1" dirty="0">
+                <a:solidFill>
+                  <a:schemeClr val="tx1"/>
+                </a:solidFill>
+              </a:rPr>
+              <a:t>Start page</a:t>
+            </a:r>
+          </a:p>
+        </p:txBody>
+      </p:sp>
+      <p:pic>
+        <p:nvPicPr>
+          <p:cNvPr id="16" name="Graphic 15">
+            <a:extLst>
+              <a:ext uri="{FF2B5EF4-FFF2-40B4-BE49-F238E27FC236}">
+                <a16:creationId xmlns:a16="http://schemas.microsoft.com/office/drawing/2014/main" id="{6DBCA0DC-2819-2848-AEDE-F0A881956B09}"/>
+              </a:ext>
+            </a:extLst>
+          </p:cNvPr>
+          <p:cNvPicPr>
+            <a:picLocks noChangeAspect="1"/>
+          </p:cNvPicPr>
+          <p:nvPr/>
+        </p:nvPicPr>
+        <p:blipFill>
+          <a:blip r:embed="rId10">
+            <a:extLst>
+              <a:ext uri="{28A0092B-C50C-407E-A947-70E740481C1C}">
+                <a14:useLocalDpi xmlns:a14="http://schemas.microsoft.com/office/drawing/2010/main"/>
+              </a:ext>
+              <a:ext uri="{96DAC541-7B7A-43D3-8B79-37D633B846F1}">
+                <asvg:svgBlip xmlns:asvg="http://schemas.microsoft.com/office/drawing/2016/SVG/main" r:embed="rId11"/>
+              </a:ext>
+            </a:extLst>
+          </a:blip>
+          <a:stretch>
+            <a:fillRect/>
+          </a:stretch>
+        </p:blipFill>
+        <p:spPr>
+          <a:xfrm>
+            <a:off x="886593" y="2249937"/>
+            <a:ext cx="915178" cy="1307495"/>
+          </a:xfrm>
+          <a:prstGeom prst="rect">
+            <a:avLst/>
+          </a:prstGeom>
+        </p:spPr>
+      </p:pic>
+      <p:sp>
+        <p:nvSpPr>
+          <p:cNvPr id="18" name="Rounded Rectangle 17">
+            <a:extLst>
+              <a:ext uri="{FF2B5EF4-FFF2-40B4-BE49-F238E27FC236}">
+                <a16:creationId xmlns:a16="http://schemas.microsoft.com/office/drawing/2014/main" id="{804967F9-F527-9743-A514-CEF31C6A5D6F}"/>
+              </a:ext>
+            </a:extLst>
+          </p:cNvPr>
+          <p:cNvSpPr/>
+          <p:nvPr/>
+        </p:nvSpPr>
+        <p:spPr>
+          <a:xfrm>
+            <a:off x="3282759" y="1695149"/>
+            <a:ext cx="758486" cy="283913"/>
+          </a:xfrm>
+          <a:prstGeom prst="roundRect">
+            <a:avLst>
+              <a:gd name="adj" fmla="val 50000"/>
+            </a:avLst>
+          </a:prstGeom>
+          <a:solidFill>
+            <a:schemeClr val="bg1"/>
+          </a:solidFill>
+          <a:ln>
+            <a:noFill/>
+          </a:ln>
+        </p:spPr>
+        <p:style>
+          <a:lnRef idx="2">
+            <a:schemeClr val="accent1">
+              <a:shade val="50000"/>
+            </a:schemeClr>
+          </a:lnRef>
+          <a:fillRef idx="1">
+            <a:schemeClr val="accent1"/>
+          </a:fillRef>
+          <a:effectRef idx="0">
+            <a:schemeClr val="accent1"/>
+          </a:effectRef>
+          <a:fontRef idx="minor">
+            <a:schemeClr val="lt1"/>
+          </a:fontRef>
+        </p:style>
+        <p:txBody>
+          <a:bodyPr lIns="0" tIns="0" rIns="0" bIns="0" rtlCol="0" anchor="ctr"/>
+          <a:lstStyle/>
+          <a:p>
+            <a:pPr algn="ctr"/>
+            <a:r>
+              <a:rPr lang="en-US" sz="900" b="1" dirty="0">
+                <a:solidFill>
+                  <a:schemeClr val="tx1"/>
+                </a:solidFill>
+              </a:rPr>
+              <a:t>Task list</a:t>
+            </a:r>
+          </a:p>
+        </p:txBody>
+      </p:sp>
+      <p:pic>
+        <p:nvPicPr>
+          <p:cNvPr id="19" name="Graphic 18">
+            <a:extLst>
+              <a:ext uri="{FF2B5EF4-FFF2-40B4-BE49-F238E27FC236}">
+                <a16:creationId xmlns:a16="http://schemas.microsoft.com/office/drawing/2014/main" id="{908D34CE-16FA-4F4F-8D5B-31A3284BFCEA}"/>
+              </a:ext>
+            </a:extLst>
+          </p:cNvPr>
+          <p:cNvPicPr>
+            <a:picLocks noChangeAspect="1"/>
+          </p:cNvPicPr>
+          <p:nvPr/>
+        </p:nvPicPr>
+        <p:blipFill>
+          <a:blip r:embed="rId12">
+            <a:extLst>
+              <a:ext uri="{28A0092B-C50C-407E-A947-70E740481C1C}">
+                <a14:useLocalDpi xmlns:a14="http://schemas.microsoft.com/office/drawing/2010/main"/>
+              </a:ext>
+              <a:ext uri="{96DAC541-7B7A-43D3-8B79-37D633B846F1}">
+                <asvg:svgBlip xmlns:asvg="http://schemas.microsoft.com/office/drawing/2016/SVG/main" r:embed="rId13"/>
+              </a:ext>
+            </a:extLst>
+          </a:blip>
+          <a:stretch>
+            <a:fillRect/>
+          </a:stretch>
+        </p:blipFill>
+        <p:spPr>
+          <a:xfrm>
+            <a:off x="3204413" y="2249937"/>
+            <a:ext cx="915178" cy="1307495"/>
+          </a:xfrm>
+          <a:prstGeom prst="rect">
+            <a:avLst/>
+          </a:prstGeom>
+        </p:spPr>
+      </p:pic>
+      <p:pic>
+        <p:nvPicPr>
+          <p:cNvPr id="28" name="Graphic 27">
+            <a:extLst>
+              <a:ext uri="{FF2B5EF4-FFF2-40B4-BE49-F238E27FC236}">
+                <a16:creationId xmlns:a16="http://schemas.microsoft.com/office/drawing/2014/main" id="{80161C64-4437-A344-A4C3-D3710FACC8D3}"/>
+              </a:ext>
+            </a:extLst>
+          </p:cNvPr>
+          <p:cNvPicPr>
+            <a:picLocks noChangeAspect="1"/>
+          </p:cNvPicPr>
+          <p:nvPr/>
+        </p:nvPicPr>
+        <p:blipFill>
+          <a:blip r:embed="rId14" cstate="print">
+            <a:extLst>
+              <a:ext uri="{28A0092B-C50C-407E-A947-70E740481C1C}">
+                <a14:useLocalDpi xmlns:a14="http://schemas.microsoft.com/office/drawing/2010/main"/>
+              </a:ext>
+              <a:ext uri="{96DAC541-7B7A-43D3-8B79-37D633B846F1}">
+                <asvg:svgBlip xmlns:asvg="http://schemas.microsoft.com/office/drawing/2016/SVG/main" r:embed="rId15"/>
+              </a:ext>
+            </a:extLst>
+          </a:blip>
+          <a:stretch>
+            <a:fillRect/>
+          </a:stretch>
+        </p:blipFill>
+        <p:spPr>
+          <a:xfrm>
+            <a:off x="964940" y="3784525"/>
+            <a:ext cx="758485" cy="1527677"/>
+          </a:xfrm>
+          <a:prstGeom prst="rect">
+            <a:avLst/>
+          </a:prstGeom>
+        </p:spPr>
+      </p:pic>
+      <p:pic>
+        <p:nvPicPr>
+          <p:cNvPr id="31" name="Graphic 30">
+            <a:extLst>
+              <a:ext uri="{FF2B5EF4-FFF2-40B4-BE49-F238E27FC236}">
+                <a16:creationId xmlns:a16="http://schemas.microsoft.com/office/drawing/2014/main" id="{CAD5CACF-CEC2-E144-9AD5-7D4C3148F6DC}"/>
+              </a:ext>
+            </a:extLst>
+          </p:cNvPr>
+          <p:cNvPicPr>
+            <a:picLocks noChangeAspect="1"/>
+          </p:cNvPicPr>
+          <p:nvPr/>
+        </p:nvPicPr>
+        <p:blipFill>
+          <a:blip r:embed="rId16">
+            <a:extLst>
+              <a:ext uri="{28A0092B-C50C-407E-A947-70E740481C1C}">
+                <a14:useLocalDpi xmlns:a14="http://schemas.microsoft.com/office/drawing/2010/main"/>
+              </a:ext>
+              <a:ext uri="{96DAC541-7B7A-43D3-8B79-37D633B846F1}">
+                <asvg:svgBlip xmlns:asvg="http://schemas.microsoft.com/office/drawing/2016/SVG/main" r:embed="rId17"/>
+              </a:ext>
+            </a:extLst>
+          </a:blip>
+          <a:stretch>
+            <a:fillRect/>
+          </a:stretch>
+        </p:blipFill>
+        <p:spPr>
+          <a:xfrm>
+            <a:off x="2123850" y="3784525"/>
+            <a:ext cx="758485" cy="1527677"/>
+          </a:xfrm>
+          <a:prstGeom prst="rect">
+            <a:avLst/>
+          </a:prstGeom>
+        </p:spPr>
+      </p:pic>
+      <p:pic>
+        <p:nvPicPr>
+          <p:cNvPr id="34" name="Graphic 33">
+            <a:extLst>
+              <a:ext uri="{FF2B5EF4-FFF2-40B4-BE49-F238E27FC236}">
+                <a16:creationId xmlns:a16="http://schemas.microsoft.com/office/drawing/2014/main" id="{01951C8D-A6C2-BF40-9DBF-E02F66D99ECF}"/>
+              </a:ext>
+            </a:extLst>
+          </p:cNvPr>
+          <p:cNvPicPr>
+            <a:picLocks noChangeAspect="1"/>
+          </p:cNvPicPr>
+          <p:nvPr/>
+        </p:nvPicPr>
+        <p:blipFill>
+          <a:blip r:embed="rId18">
+            <a:extLst>
+              <a:ext uri="{28A0092B-C50C-407E-A947-70E740481C1C}">
+                <a14:useLocalDpi xmlns:a14="http://schemas.microsoft.com/office/drawing/2010/main"/>
+              </a:ext>
+              <a:ext uri="{96DAC541-7B7A-43D3-8B79-37D633B846F1}">
+                <asvg:svgBlip xmlns:asvg="http://schemas.microsoft.com/office/drawing/2016/SVG/main" r:embed="rId19"/>
+              </a:ext>
+            </a:extLst>
+          </a:blip>
+          <a:stretch>
+            <a:fillRect/>
+          </a:stretch>
+        </p:blipFill>
+        <p:spPr>
+          <a:xfrm>
+            <a:off x="3283052" y="3785113"/>
+            <a:ext cx="757901" cy="1526500"/>
+          </a:xfrm>
+          <a:prstGeom prst="rect">
+            <a:avLst/>
+          </a:prstGeom>
+        </p:spPr>
+      </p:pic>
+      <p:pic>
+        <p:nvPicPr>
+          <p:cNvPr id="38" name="Graphic 37">
+            <a:extLst>
+              <a:ext uri="{FF2B5EF4-FFF2-40B4-BE49-F238E27FC236}">
+                <a16:creationId xmlns:a16="http://schemas.microsoft.com/office/drawing/2014/main" id="{CEDCDAB7-C8F9-4F4B-9950-4398A65E5B9F}"/>
+              </a:ext>
+            </a:extLst>
+          </p:cNvPr>
+          <p:cNvPicPr>
+            <a:picLocks noChangeAspect="1"/>
+          </p:cNvPicPr>
+          <p:nvPr/>
+        </p:nvPicPr>
+        <p:blipFill>
+          <a:blip r:embed="rId20">
+            <a:extLst>
+              <a:ext uri="{28A0092B-C50C-407E-A947-70E740481C1C}">
+                <a14:useLocalDpi xmlns:a14="http://schemas.microsoft.com/office/drawing/2010/main"/>
+              </a:ext>
+              <a:ext uri="{96DAC541-7B7A-43D3-8B79-37D633B846F1}">
+                <asvg:svgBlip xmlns:asvg="http://schemas.microsoft.com/office/drawing/2016/SVG/main" r:embed="rId21"/>
+              </a:ext>
+            </a:extLst>
+          </a:blip>
+          <a:stretch>
+            <a:fillRect/>
+          </a:stretch>
+        </p:blipFill>
+        <p:spPr>
+          <a:xfrm>
+            <a:off x="7872381" y="3785113"/>
+            <a:ext cx="757901" cy="1526500"/>
+          </a:xfrm>
+          <a:prstGeom prst="rect">
+            <a:avLst/>
+          </a:prstGeom>
+        </p:spPr>
+      </p:pic>
+      <p:pic>
+        <p:nvPicPr>
+          <p:cNvPr id="41" name="Graphic 40">
+            <a:extLst>
+              <a:ext uri="{FF2B5EF4-FFF2-40B4-BE49-F238E27FC236}">
+                <a16:creationId xmlns:a16="http://schemas.microsoft.com/office/drawing/2014/main" id="{E63190B5-18F6-2744-96BB-FCB0194FBFDC}"/>
+              </a:ext>
+            </a:extLst>
+          </p:cNvPr>
+          <p:cNvPicPr>
+            <a:picLocks noChangeAspect="1"/>
+          </p:cNvPicPr>
+          <p:nvPr/>
+        </p:nvPicPr>
+        <p:blipFill>
+          <a:blip r:embed="rId22">
+            <a:extLst>
+              <a:ext uri="{28A0092B-C50C-407E-A947-70E740481C1C}">
+                <a14:useLocalDpi xmlns:a14="http://schemas.microsoft.com/office/drawing/2010/main"/>
+              </a:ext>
+              <a:ext uri="{96DAC541-7B7A-43D3-8B79-37D633B846F1}">
+                <asvg:svgBlip xmlns:asvg="http://schemas.microsoft.com/office/drawing/2016/SVG/main" r:embed="rId23"/>
+              </a:ext>
+            </a:extLst>
+          </a:blip>
+          <a:stretch>
+            <a:fillRect/>
+          </a:stretch>
+        </p:blipFill>
+        <p:spPr>
+          <a:xfrm>
+            <a:off x="10299807" y="3785113"/>
+            <a:ext cx="757900" cy="1526500"/>
+          </a:xfrm>
+          <a:prstGeom prst="rect">
+            <a:avLst/>
+          </a:prstGeom>
+        </p:spPr>
+      </p:pic>
+      <p:pic>
+        <p:nvPicPr>
+          <p:cNvPr id="45" name="Graphic 44">
+            <a:extLst>
+              <a:ext uri="{FF2B5EF4-FFF2-40B4-BE49-F238E27FC236}">
+                <a16:creationId xmlns:a16="http://schemas.microsoft.com/office/drawing/2014/main" id="{E3B780EB-CFFD-844F-BDA5-C5E1CB75C2EB}"/>
+              </a:ext>
+            </a:extLst>
+          </p:cNvPr>
+          <p:cNvPicPr>
+            <a:picLocks noChangeAspect="1"/>
+          </p:cNvPicPr>
+          <p:nvPr/>
+        </p:nvPicPr>
+        <p:blipFill>
+          <a:blip r:embed="rId24">
+            <a:extLst>
+              <a:ext uri="{28A0092B-C50C-407E-A947-70E740481C1C}">
+                <a14:useLocalDpi xmlns:a14="http://schemas.microsoft.com/office/drawing/2010/main"/>
+              </a:ext>
+              <a:ext uri="{96DAC541-7B7A-43D3-8B79-37D633B846F1}">
+                <asvg:svgBlip xmlns:asvg="http://schemas.microsoft.com/office/drawing/2016/SVG/main" r:embed="rId25"/>
+              </a:ext>
+            </a:extLst>
+          </a:blip>
+          <a:stretch>
+            <a:fillRect/>
+          </a:stretch>
+        </p:blipFill>
+        <p:spPr>
+          <a:xfrm>
+            <a:off x="9106052" y="3785113"/>
+            <a:ext cx="757901" cy="1526500"/>
+          </a:xfrm>
+          <a:prstGeom prst="rect">
+            <a:avLst/>
+          </a:prstGeom>
+        </p:spPr>
+      </p:pic>
+      <p:pic>
+        <p:nvPicPr>
+          <p:cNvPr id="50" name="Graphic 49">
+            <a:extLst>
+              <a:ext uri="{FF2B5EF4-FFF2-40B4-BE49-F238E27FC236}">
+                <a16:creationId xmlns:a16="http://schemas.microsoft.com/office/drawing/2014/main" id="{6022B4A8-B6B1-B243-956E-67A8CD2367CA}"/>
+              </a:ext>
+            </a:extLst>
+          </p:cNvPr>
+          <p:cNvPicPr>
+            <a:picLocks noChangeAspect="1"/>
+          </p:cNvPicPr>
+          <p:nvPr/>
+        </p:nvPicPr>
+        <p:blipFill>
+          <a:blip r:embed="rId26">
+            <a:extLst>
+              <a:ext uri="{96DAC541-7B7A-43D3-8B79-37D633B846F1}">
+                <asvg:svgBlip xmlns:asvg="http://schemas.microsoft.com/office/drawing/2016/SVG/main" r:embed="rId27"/>
+              </a:ext>
+            </a:extLst>
+          </a:blip>
+          <a:stretch>
+            <a:fillRect/>
+          </a:stretch>
+        </p:blipFill>
+        <p:spPr>
+          <a:xfrm>
+            <a:off x="6636014" y="2249888"/>
+            <a:ext cx="915246" cy="1307592"/>
+          </a:xfrm>
+          <a:prstGeom prst="rect">
+            <a:avLst/>
+          </a:prstGeom>
+        </p:spPr>
+      </p:pic>
+      <p:pic>
+        <p:nvPicPr>
+          <p:cNvPr id="52" name="Graphic 51">
+            <a:extLst>
+              <a:ext uri="{FF2B5EF4-FFF2-40B4-BE49-F238E27FC236}">
+                <a16:creationId xmlns:a16="http://schemas.microsoft.com/office/drawing/2014/main" id="{3917743D-35C5-5F4F-AA41-0B9BA54B4789}"/>
+              </a:ext>
+            </a:extLst>
+          </p:cNvPr>
+          <p:cNvPicPr>
+            <a:picLocks noChangeAspect="1"/>
+          </p:cNvPicPr>
+          <p:nvPr/>
+        </p:nvPicPr>
+        <p:blipFill>
+          <a:blip r:embed="rId28">
+            <a:extLst>
+              <a:ext uri="{96DAC541-7B7A-43D3-8B79-37D633B846F1}">
+                <asvg:svgBlip xmlns:asvg="http://schemas.microsoft.com/office/drawing/2016/SVG/main" r:embed="rId29"/>
+              </a:ext>
+            </a:extLst>
+          </a:blip>
+          <a:stretch>
+            <a:fillRect/>
+          </a:stretch>
+        </p:blipFill>
+        <p:spPr>
+          <a:xfrm>
+            <a:off x="5497703" y="2249888"/>
+            <a:ext cx="915246" cy="1307592"/>
+          </a:xfrm>
+          <a:prstGeom prst="rect">
+            <a:avLst/>
+          </a:prstGeom>
+        </p:spPr>
+      </p:pic>
+      <p:pic>
+        <p:nvPicPr>
+          <p:cNvPr id="54" name="Graphic 53">
+            <a:extLst>
+              <a:ext uri="{FF2B5EF4-FFF2-40B4-BE49-F238E27FC236}">
+                <a16:creationId xmlns:a16="http://schemas.microsoft.com/office/drawing/2014/main" id="{ACF531F9-7820-BA42-8EDC-2C02202A031B}"/>
+              </a:ext>
+            </a:extLst>
+          </p:cNvPr>
+          <p:cNvPicPr>
+            <a:picLocks noChangeAspect="1"/>
+          </p:cNvPicPr>
+          <p:nvPr/>
+        </p:nvPicPr>
+        <p:blipFill>
+          <a:blip r:embed="rId30">
+            <a:extLst>
+              <a:ext uri="{96DAC541-7B7A-43D3-8B79-37D633B846F1}">
+                <asvg:svgBlip xmlns:asvg="http://schemas.microsoft.com/office/drawing/2016/SVG/main" r:embed="rId31"/>
+              </a:ext>
+            </a:extLst>
+          </a:blip>
+          <a:stretch>
+            <a:fillRect/>
+          </a:stretch>
+        </p:blipFill>
+        <p:spPr>
+          <a:xfrm>
+            <a:off x="4386688" y="2249888"/>
+            <a:ext cx="915246" cy="1307592"/>
+          </a:xfrm>
+          <a:prstGeom prst="rect">
+            <a:avLst/>
+          </a:prstGeom>
+        </p:spPr>
+      </p:pic>
+      <p:pic>
+        <p:nvPicPr>
+          <p:cNvPr id="56" name="Graphic 55">
+            <a:extLst>
+              <a:ext uri="{FF2B5EF4-FFF2-40B4-BE49-F238E27FC236}">
+                <a16:creationId xmlns:a16="http://schemas.microsoft.com/office/drawing/2014/main" id="{4C4AF1BD-B80D-4247-A77F-5DAB1800309A}"/>
+              </a:ext>
+            </a:extLst>
+          </p:cNvPr>
+          <p:cNvPicPr>
+            <a:picLocks noChangeAspect="1"/>
+          </p:cNvPicPr>
+          <p:nvPr/>
+        </p:nvPicPr>
+        <p:blipFill>
+          <a:blip r:embed="rId32">
+            <a:extLst>
+              <a:ext uri="{96DAC541-7B7A-43D3-8B79-37D633B846F1}">
+                <asvg:svgBlip xmlns:asvg="http://schemas.microsoft.com/office/drawing/2016/SVG/main" r:embed="rId33"/>
+              </a:ext>
+            </a:extLst>
+          </a:blip>
+          <a:stretch>
+            <a:fillRect/>
+          </a:stretch>
+        </p:blipFill>
+        <p:spPr>
+          <a:xfrm flipH="1">
+            <a:off x="6714464" y="3784664"/>
+            <a:ext cx="758347" cy="1527399"/>
+          </a:xfrm>
+          <a:prstGeom prst="rect">
+            <a:avLst/>
+          </a:prstGeom>
+        </p:spPr>
+      </p:pic>
+      <p:pic>
+        <p:nvPicPr>
+          <p:cNvPr id="58" name="Graphic 57">
+            <a:extLst>
+              <a:ext uri="{FF2B5EF4-FFF2-40B4-BE49-F238E27FC236}">
+                <a16:creationId xmlns:a16="http://schemas.microsoft.com/office/drawing/2014/main" id="{199C8A3E-8432-7549-9549-95B04CA1F692}"/>
+              </a:ext>
+            </a:extLst>
+          </p:cNvPr>
+          <p:cNvPicPr>
+            <a:picLocks noChangeAspect="1"/>
+          </p:cNvPicPr>
+          <p:nvPr/>
+        </p:nvPicPr>
+        <p:blipFill>
+          <a:blip r:embed="rId34">
+            <a:extLst>
+              <a:ext uri="{96DAC541-7B7A-43D3-8B79-37D633B846F1}">
+                <asvg:svgBlip xmlns:asvg="http://schemas.microsoft.com/office/drawing/2016/SVG/main" r:embed="rId35"/>
+              </a:ext>
+            </a:extLst>
+          </a:blip>
+          <a:stretch>
+            <a:fillRect/>
+          </a:stretch>
+        </p:blipFill>
+        <p:spPr>
+          <a:xfrm flipH="1">
+            <a:off x="5576153" y="3784664"/>
+            <a:ext cx="758347" cy="1527399"/>
+          </a:xfrm>
+          <a:prstGeom prst="rect">
+            <a:avLst/>
+          </a:prstGeom>
+        </p:spPr>
+      </p:pic>
+      <p:pic>
+        <p:nvPicPr>
+          <p:cNvPr id="60" name="Graphic 59">
+            <a:extLst>
+              <a:ext uri="{FF2B5EF4-FFF2-40B4-BE49-F238E27FC236}">
+                <a16:creationId xmlns:a16="http://schemas.microsoft.com/office/drawing/2014/main" id="{88CD1BA2-C736-094A-A507-CFE3669C6C62}"/>
+              </a:ext>
+            </a:extLst>
+          </p:cNvPr>
+          <p:cNvPicPr>
+            <a:picLocks noChangeAspect="1"/>
+          </p:cNvPicPr>
+          <p:nvPr/>
+        </p:nvPicPr>
+        <p:blipFill>
+          <a:blip r:embed="rId36">
+            <a:extLst>
+              <a:ext uri="{96DAC541-7B7A-43D3-8B79-37D633B846F1}">
+                <asvg:svgBlip xmlns:asvg="http://schemas.microsoft.com/office/drawing/2016/SVG/main" r:embed="rId37"/>
+              </a:ext>
+            </a:extLst>
+          </a:blip>
+          <a:stretch>
+            <a:fillRect/>
+          </a:stretch>
+        </p:blipFill>
+        <p:spPr>
+          <a:xfrm flipH="1">
+            <a:off x="4465138" y="3784664"/>
+            <a:ext cx="758347" cy="1527399"/>
+          </a:xfrm>
+          <a:prstGeom prst="rect">
+            <a:avLst/>
+          </a:prstGeom>
+        </p:spPr>
+      </p:pic>
+      <p:sp>
+        <p:nvSpPr>
+          <p:cNvPr id="62" name="Rounded Rectangle 61">
+            <a:extLst>
+              <a:ext uri="{FF2B5EF4-FFF2-40B4-BE49-F238E27FC236}">
+                <a16:creationId xmlns:a16="http://schemas.microsoft.com/office/drawing/2014/main" id="{0F403BD4-1B4D-494F-BFDE-E901934027C6}"/>
+              </a:ext>
+            </a:extLst>
+          </p:cNvPr>
+          <p:cNvSpPr/>
+          <p:nvPr/>
+        </p:nvSpPr>
+        <p:spPr>
+          <a:xfrm>
+            <a:off x="6575463" y="1695149"/>
+            <a:ext cx="1036349" cy="283913"/>
+          </a:xfrm>
+          <a:prstGeom prst="roundRect">
+            <a:avLst>
+              <a:gd name="adj" fmla="val 50000"/>
+            </a:avLst>
+          </a:prstGeom>
+          <a:solidFill>
+            <a:schemeClr val="bg1"/>
+          </a:solidFill>
+          <a:ln>
+            <a:noFill/>
+          </a:ln>
+        </p:spPr>
+        <p:style>
+          <a:lnRef idx="2">
+            <a:schemeClr val="accent1">
+              <a:shade val="50000"/>
+            </a:schemeClr>
+          </a:lnRef>
+          <a:fillRef idx="1">
+            <a:schemeClr val="accent1"/>
+          </a:fillRef>
+          <a:effectRef idx="0">
+            <a:schemeClr val="accent1"/>
+          </a:effectRef>
+          <a:fontRef idx="minor">
+            <a:schemeClr val="lt1"/>
+          </a:fontRef>
+        </p:style>
+        <p:txBody>
+          <a:bodyPr lIns="0" tIns="0" rIns="0" bIns="0" rtlCol="0" anchor="ctr"/>
+          <a:lstStyle/>
+          <a:p>
+            <a:pPr algn="ctr"/>
+            <a:r>
+              <a:rPr lang="en-US" sz="900" b="1" dirty="0">
+                <a:solidFill>
+                  <a:schemeClr val="tx1"/>
+                </a:solidFill>
+              </a:rPr>
+              <a:t>Q: Checkbox</a:t>
+            </a:r>
+          </a:p>
+        </p:txBody>
+      </p:sp>
+      <p:sp>
+        <p:nvSpPr>
+          <p:cNvPr id="63" name="Rounded Rectangle 62">
+            <a:extLst>
+              <a:ext uri="{FF2B5EF4-FFF2-40B4-BE49-F238E27FC236}">
+                <a16:creationId xmlns:a16="http://schemas.microsoft.com/office/drawing/2014/main" id="{0C6D3D5D-FC1B-E84C-8805-A4EA481EA2DD}"/>
+              </a:ext>
+            </a:extLst>
+          </p:cNvPr>
+          <p:cNvSpPr/>
+          <p:nvPr/>
+        </p:nvSpPr>
+        <p:spPr>
+          <a:xfrm>
+            <a:off x="4437119" y="1695149"/>
+            <a:ext cx="814384" cy="283913"/>
+          </a:xfrm>
+          <a:prstGeom prst="roundRect">
+            <a:avLst>
+              <a:gd name="adj" fmla="val 50000"/>
+            </a:avLst>
+          </a:prstGeom>
+          <a:solidFill>
+            <a:schemeClr val="bg1"/>
+          </a:solidFill>
+          <a:ln>
+            <a:noFill/>
+          </a:ln>
+        </p:spPr>
+        <p:style>
+          <a:lnRef idx="2">
+            <a:schemeClr val="accent1">
+              <a:shade val="50000"/>
+            </a:schemeClr>
+          </a:lnRef>
+          <a:fillRef idx="1">
+            <a:schemeClr val="accent1"/>
+          </a:fillRef>
+          <a:effectRef idx="0">
+            <a:schemeClr val="accent1"/>
+          </a:effectRef>
+          <a:fontRef idx="minor">
+            <a:schemeClr val="lt1"/>
+          </a:fontRef>
+        </p:style>
+        <p:txBody>
+          <a:bodyPr lIns="0" tIns="0" rIns="0" bIns="0" rtlCol="0" anchor="ctr"/>
+          <a:lstStyle/>
+          <a:p>
+            <a:pPr algn="ctr"/>
+            <a:r>
+              <a:rPr lang="en-US" sz="900" b="1" dirty="0">
+                <a:solidFill>
+                  <a:schemeClr val="tx1"/>
+                </a:solidFill>
+              </a:rPr>
+              <a:t>Q: Text</a:t>
+            </a:r>
+          </a:p>
+        </p:txBody>
+      </p:sp>
+      <p:sp>
+        <p:nvSpPr>
+          <p:cNvPr id="64" name="Rounded Rectangle 63">
+            <a:extLst>
+              <a:ext uri="{FF2B5EF4-FFF2-40B4-BE49-F238E27FC236}">
+                <a16:creationId xmlns:a16="http://schemas.microsoft.com/office/drawing/2014/main" id="{58023F30-DF59-5748-A7CE-01E255AE9DA9}"/>
+              </a:ext>
+            </a:extLst>
+          </p:cNvPr>
+          <p:cNvSpPr/>
+          <p:nvPr/>
+        </p:nvSpPr>
+        <p:spPr>
+          <a:xfrm>
+            <a:off x="5437152" y="1695149"/>
+            <a:ext cx="1036349" cy="283913"/>
+          </a:xfrm>
+          <a:prstGeom prst="roundRect">
+            <a:avLst>
+              <a:gd name="adj" fmla="val 50000"/>
+            </a:avLst>
+          </a:prstGeom>
+          <a:solidFill>
+            <a:schemeClr val="bg1"/>
+          </a:solidFill>
+          <a:ln>
+            <a:noFill/>
+          </a:ln>
+        </p:spPr>
+        <p:style>
+          <a:lnRef idx="2">
+            <a:schemeClr val="accent1">
+              <a:shade val="50000"/>
+            </a:schemeClr>
+          </a:lnRef>
+          <a:fillRef idx="1">
+            <a:schemeClr val="accent1"/>
+          </a:fillRef>
+          <a:effectRef idx="0">
+            <a:schemeClr val="accent1"/>
+          </a:effectRef>
+          <a:fontRef idx="minor">
+            <a:schemeClr val="lt1"/>
+          </a:fontRef>
+        </p:style>
+        <p:txBody>
+          <a:bodyPr lIns="0" tIns="0" rIns="0" bIns="0" rtlCol="0" anchor="ctr"/>
+          <a:lstStyle/>
+          <a:p>
+            <a:pPr algn="ctr"/>
+            <a:r>
+              <a:rPr lang="en-US" sz="900" b="1" dirty="0">
+                <a:solidFill>
+                  <a:schemeClr val="tx1"/>
+                </a:solidFill>
+              </a:rPr>
+              <a:t>Q: Radio</a:t>
+            </a:r>
+          </a:p>
+        </p:txBody>
+      </p:sp>
+    </p:spTree>
+    <p:extLst>
+      <p:ext uri="{BB962C8B-B14F-4D97-AF65-F5344CB8AC3E}">
+        <p14:creationId xmlns:p14="http://schemas.microsoft.com/office/powerpoint/2010/main" val="3721355442"/>
+      </p:ext>
+    </p:extLst>
+  </p:cSld>
+  <p:clrMapOvr>
+    <a:masterClrMapping/>
+  </p:clrMapOvr>
+</p:sld>
+</file>
+
+<file path=ppt/slides/slide2.xml><?xml version="1.0" encoding="utf-8"?>
+<p:sld xmlns:a="http://schemas.openxmlformats.org/drawingml/2006/main" xmlns:r="http://schemas.openxmlformats.org/officeDocument/2006/relationships" xmlns:p="http://schemas.openxmlformats.org/presentationml/2006/main">
+  <p:cSld>
+    <p:spTree>
+      <p:nvGrpSpPr>
+        <p:cNvPr id="1" name=""/>
+        <p:cNvGrpSpPr/>
+        <p:nvPr/>
+      </p:nvGrpSpPr>
+      <p:grpSpPr>
+        <a:xfrm>
+          <a:off x="0" y="0"/>
+          <a:ext cx="0" cy="0"/>
+          <a:chOff x="0" y="0"/>
+          <a:chExt cx="0" cy="0"/>
+        </a:xfrm>
+      </p:grpSpPr>
       <p:cxnSp>
         <p:nvCxnSpPr>
           <p:cNvPr id="27" name="Straight Arrow Connector 26">
@@ -830,6 +2137,9 @@
           <p:blipFill>
             <a:blip r:embed="rId4">
               <a:extLst>
+                <a:ext uri="{28A0092B-C50C-407E-A947-70E740481C1C}">
+                  <a14:useLocalDpi xmlns:a14="http://schemas.microsoft.com/office/drawing/2010/main"/>
+                </a:ext>
                 <a:ext uri="{96DAC541-7B7A-43D3-8B79-37D633B846F1}">
                   <asvg:svgBlip xmlns:asvg="http://schemas.microsoft.com/office/drawing/2016/SVG/main" r:embed="rId5"/>
                 </a:ext>
@@ -950,6 +2260,9 @@
           <p:blipFill>
             <a:blip r:embed="rId6">
               <a:extLst>
+                <a:ext uri="{28A0092B-C50C-407E-A947-70E740481C1C}">
+                  <a14:useLocalDpi xmlns:a14="http://schemas.microsoft.com/office/drawing/2010/main"/>
+                </a:ext>
                 <a:ext uri="{96DAC541-7B7A-43D3-8B79-37D633B846F1}">
                   <asvg:svgBlip xmlns:asvg="http://schemas.microsoft.com/office/drawing/2016/SVG/main" r:embed="rId7"/>
                 </a:ext>
@@ -1164,6 +2477,9 @@
           <p:blipFill>
             <a:blip r:embed="rId8">
               <a:extLst>
+                <a:ext uri="{28A0092B-C50C-407E-A947-70E740481C1C}">
+                  <a14:useLocalDpi xmlns:a14="http://schemas.microsoft.com/office/drawing/2010/main"/>
+                </a:ext>
                 <a:ext uri="{96DAC541-7B7A-43D3-8B79-37D633B846F1}">
                   <asvg:svgBlip xmlns:asvg="http://schemas.microsoft.com/office/drawing/2016/SVG/main" r:embed="rId9"/>
                 </a:ext>
@@ -1284,6 +2600,9 @@
           <p:blipFill>
             <a:blip r:embed="rId10">
               <a:extLst>
+                <a:ext uri="{28A0092B-C50C-407E-A947-70E740481C1C}">
+                  <a14:useLocalDpi xmlns:a14="http://schemas.microsoft.com/office/drawing/2010/main"/>
+                </a:ext>
                 <a:ext uri="{96DAC541-7B7A-43D3-8B79-37D633B846F1}">
                   <asvg:svgBlip xmlns:asvg="http://schemas.microsoft.com/office/drawing/2016/SVG/main" r:embed="rId11"/>
                 </a:ext>
@@ -1451,6 +2770,9 @@
           <p:blipFill>
             <a:blip r:embed="rId12">
               <a:extLst>
+                <a:ext uri="{28A0092B-C50C-407E-A947-70E740481C1C}">
+                  <a14:useLocalDpi xmlns:a14="http://schemas.microsoft.com/office/drawing/2010/main"/>
+                </a:ext>
                 <a:ext uri="{96DAC541-7B7A-43D3-8B79-37D633B846F1}">
                   <asvg:svgBlip xmlns:asvg="http://schemas.microsoft.com/office/drawing/2016/SVG/main" r:embed="rId13"/>
                 </a:ext>
@@ -1701,6 +3023,9 @@
             <p:blipFill>
               <a:blip r:embed="rId14">
                 <a:extLst>
+                  <a:ext uri="{28A0092B-C50C-407E-A947-70E740481C1C}">
+                    <a14:useLocalDpi xmlns:a14="http://schemas.microsoft.com/office/drawing/2010/main"/>
+                  </a:ext>
                   <a:ext uri="{96DAC541-7B7A-43D3-8B79-37D633B846F1}">
                     <asvg:svgBlip xmlns:asvg="http://schemas.microsoft.com/office/drawing/2016/SVG/main" r:embed="rId15"/>
                   </a:ext>
@@ -1737,6 +3062,9 @@
             <p:blipFill>
               <a:blip r:embed="rId16">
                 <a:extLst>
+                  <a:ext uri="{28A0092B-C50C-407E-A947-70E740481C1C}">
+                    <a14:useLocalDpi xmlns:a14="http://schemas.microsoft.com/office/drawing/2010/main"/>
+                  </a:ext>
                   <a:ext uri="{96DAC541-7B7A-43D3-8B79-37D633B846F1}">
                     <asvg:svgBlip xmlns:asvg="http://schemas.microsoft.com/office/drawing/2016/SVG/main" r:embed="rId17"/>
                   </a:ext>
@@ -1773,6 +3101,9 @@
             <p:blipFill>
               <a:blip r:embed="rId18">
                 <a:extLst>
+                  <a:ext uri="{28A0092B-C50C-407E-A947-70E740481C1C}">
+                    <a14:useLocalDpi xmlns:a14="http://schemas.microsoft.com/office/drawing/2010/main"/>
+                  </a:ext>
                   <a:ext uri="{96DAC541-7B7A-43D3-8B79-37D633B846F1}">
                     <asvg:svgBlip xmlns:asvg="http://schemas.microsoft.com/office/drawing/2016/SVG/main" r:embed="rId19"/>
                   </a:ext>
@@ -1854,7 +3185,7 @@
 </p:sld>
 </file>
 
-<file path=ppt/slides/slide2.xml><?xml version="1.0" encoding="utf-8"?>
+<file path=ppt/slides/slide3.xml><?xml version="1.0" encoding="utf-8"?>
 <p:sld xmlns:a="http://schemas.openxmlformats.org/drawingml/2006/main" xmlns:r="http://schemas.openxmlformats.org/officeDocument/2006/relationships" xmlns:p="http://schemas.openxmlformats.org/presentationml/2006/main">
   <p:cSld>
     <p:spTree>
@@ -2006,6 +3337,9 @@
           <p:blipFill>
             <a:blip r:embed="rId2">
               <a:extLst>
+                <a:ext uri="{28A0092B-C50C-407E-A947-70E740481C1C}">
+                  <a14:useLocalDpi xmlns:a14="http://schemas.microsoft.com/office/drawing/2010/main"/>
+                </a:ext>
                 <a:ext uri="{96DAC541-7B7A-43D3-8B79-37D633B846F1}">
                   <asvg:svgBlip xmlns:asvg="http://schemas.microsoft.com/office/drawing/2016/SVG/main" r:embed="rId3"/>
                 </a:ext>
@@ -2126,6 +3460,9 @@
           <p:blipFill>
             <a:blip r:embed="rId4">
               <a:extLst>
+                <a:ext uri="{28A0092B-C50C-407E-A947-70E740481C1C}">
+                  <a14:useLocalDpi xmlns:a14="http://schemas.microsoft.com/office/drawing/2010/main"/>
+                </a:ext>
                 <a:ext uri="{96DAC541-7B7A-43D3-8B79-37D633B846F1}">
                   <asvg:svgBlip xmlns:asvg="http://schemas.microsoft.com/office/drawing/2016/SVG/main" r:embed="rId5"/>
                 </a:ext>
@@ -2246,6 +3583,9 @@
           <p:blipFill>
             <a:blip r:embed="rId6">
               <a:extLst>
+                <a:ext uri="{28A0092B-C50C-407E-A947-70E740481C1C}">
+                  <a14:useLocalDpi xmlns:a14="http://schemas.microsoft.com/office/drawing/2010/main"/>
+                </a:ext>
                 <a:ext uri="{96DAC541-7B7A-43D3-8B79-37D633B846F1}">
                   <asvg:svgBlip xmlns:asvg="http://schemas.microsoft.com/office/drawing/2016/SVG/main" r:embed="rId7"/>
                 </a:ext>
@@ -2366,6 +3706,9 @@
           <p:blipFill>
             <a:blip r:embed="rId8">
               <a:extLst>
+                <a:ext uri="{28A0092B-C50C-407E-A947-70E740481C1C}">
+                  <a14:useLocalDpi xmlns:a14="http://schemas.microsoft.com/office/drawing/2010/main"/>
+                </a:ext>
                 <a:ext uri="{96DAC541-7B7A-43D3-8B79-37D633B846F1}">
                   <asvg:svgBlip xmlns:asvg="http://schemas.microsoft.com/office/drawing/2016/SVG/main" r:embed="rId9"/>
                 </a:ext>
@@ -2486,6 +3829,9 @@
           <p:blipFill>
             <a:blip r:embed="rId10">
               <a:extLst>
+                <a:ext uri="{28A0092B-C50C-407E-A947-70E740481C1C}">
+                  <a14:useLocalDpi xmlns:a14="http://schemas.microsoft.com/office/drawing/2010/main"/>
+                </a:ext>
                 <a:ext uri="{96DAC541-7B7A-43D3-8B79-37D633B846F1}">
                   <asvg:svgBlip xmlns:asvg="http://schemas.microsoft.com/office/drawing/2016/SVG/main" r:embed="rId11"/>
                 </a:ext>
@@ -2606,6 +3952,9 @@
           <p:blipFill>
             <a:blip r:embed="rId12">
               <a:extLst>
+                <a:ext uri="{28A0092B-C50C-407E-A947-70E740481C1C}">
+                  <a14:useLocalDpi xmlns:a14="http://schemas.microsoft.com/office/drawing/2010/main"/>
+                </a:ext>
                 <a:ext uri="{96DAC541-7B7A-43D3-8B79-37D633B846F1}">
                   <asvg:svgBlip xmlns:asvg="http://schemas.microsoft.com/office/drawing/2016/SVG/main" r:embed="rId13"/>
                 </a:ext>
@@ -2663,6 +4012,9 @@
           <p:blipFill>
             <a:blip r:embed="rId14">
               <a:extLst>
+                <a:ext uri="{28A0092B-C50C-407E-A947-70E740481C1C}">
+                  <a14:useLocalDpi xmlns:a14="http://schemas.microsoft.com/office/drawing/2010/main"/>
+                </a:ext>
                 <a:ext uri="{96DAC541-7B7A-43D3-8B79-37D633B846F1}">
                   <asvg:svgBlip xmlns:asvg="http://schemas.microsoft.com/office/drawing/2016/SVG/main" r:embed="rId15"/>
                 </a:ext>
@@ -2762,6 +4114,9 @@
           <p:blipFill>
             <a:blip r:embed="rId16">
               <a:extLst>
+                <a:ext uri="{28A0092B-C50C-407E-A947-70E740481C1C}">
+                  <a14:useLocalDpi xmlns:a14="http://schemas.microsoft.com/office/drawing/2010/main"/>
+                </a:ext>
                 <a:ext uri="{96DAC541-7B7A-43D3-8B79-37D633B846F1}">
                   <asvg:svgBlip xmlns:asvg="http://schemas.microsoft.com/office/drawing/2016/SVG/main" r:embed="rId17"/>
                 </a:ext>
@@ -2798,6 +4153,9 @@
           <p:blipFill>
             <a:blip r:embed="rId18">
               <a:extLst>
+                <a:ext uri="{28A0092B-C50C-407E-A947-70E740481C1C}">
+                  <a14:useLocalDpi xmlns:a14="http://schemas.microsoft.com/office/drawing/2010/main"/>
+                </a:ext>
                 <a:ext uri="{96DAC541-7B7A-43D3-8B79-37D633B846F1}">
                   <asvg:svgBlip xmlns:asvg="http://schemas.microsoft.com/office/drawing/2016/SVG/main" r:embed="rId19"/>
                 </a:ext>

</xml_diff>

<commit_message>
Added a hero icon
</commit_message>
<xml_diff>
--- a/templates/template-powerpoint.pptx
+++ b/templates/template-powerpoint.pptx
@@ -162,7 +162,7 @@
           <a:p>
             <a:fld id="{D4D58C0E-4B6B-5F40-A2C8-B41F0781BD76}" type="datetimeFigureOut">
               <a:rPr lang="en-US" smtClean="0"/>
-              <a:t>2/13/21</a:t>
+              <a:t>6/7/21</a:t>
             </a:fld>
             <a:endParaRPr lang="en-US"/>
           </a:p>
@@ -603,8 +603,8 @@
         </p:nvSpPr>
         <p:spPr>
           <a:xfrm>
-            <a:off x="775776" y="471931"/>
-            <a:ext cx="5282215" cy="646331"/>
+            <a:off x="853050" y="597661"/>
+            <a:ext cx="4737194" cy="584775"/>
           </a:xfrm>
           <a:prstGeom prst="rect">
             <a:avLst/>
@@ -618,15 +618,15 @@
           <a:lstStyle/>
           <a:p>
             <a:r>
-              <a:rPr lang="en-US" sz="3600" b="1" dirty="0"/>
+              <a:rPr lang="en-US" sz="3200" b="1" dirty="0"/>
               <a:t>GOV.UK </a:t>
             </a:r>
             <a:r>
-              <a:rPr lang="en-US" sz="3600" b="1" dirty="0" err="1"/>
+              <a:rPr lang="en-US" sz="3200" b="1" dirty="0" err="1"/>
               <a:t>Userflow</a:t>
             </a:r>
             <a:r>
-              <a:rPr lang="en-US" sz="3600" b="1" dirty="0"/>
+              <a:rPr lang="en-US" sz="3200" b="1" dirty="0"/>
               <a:t> Icons</a:t>
             </a:r>
           </a:p>
@@ -646,8 +646,8 @@
         </p:nvSpPr>
         <p:spPr>
           <a:xfrm>
-            <a:off x="7733157" y="1695149"/>
-            <a:ext cx="1036349" cy="283913"/>
+            <a:off x="7466875" y="1695149"/>
+            <a:ext cx="845165" cy="231537"/>
           </a:xfrm>
           <a:prstGeom prst="roundRect">
             <a:avLst>
@@ -683,7 +683,7 @@
           <a:p>
             <a:pPr algn="ctr"/>
             <a:r>
-              <a:rPr lang="en-US" sz="900" b="1" dirty="0">
+              <a:rPr lang="en-US" sz="800" b="1" dirty="0">
                 <a:solidFill>
                   <a:schemeClr val="tx1"/>
                 </a:solidFill>
@@ -724,8 +724,8 @@
         </p:blipFill>
         <p:spPr>
           <a:xfrm>
-            <a:off x="7793742" y="2249937"/>
-            <a:ext cx="915178" cy="1307495"/>
+            <a:off x="7516283" y="2147591"/>
+            <a:ext cx="746348" cy="1066290"/>
           </a:xfrm>
           <a:prstGeom prst="rect">
             <a:avLst/>
@@ -746,8 +746,8 @@
         </p:nvSpPr>
         <p:spPr>
           <a:xfrm>
-            <a:off x="10230195" y="1695149"/>
-            <a:ext cx="897125" cy="283913"/>
+            <a:off x="9503263" y="1695149"/>
+            <a:ext cx="731625" cy="231537"/>
           </a:xfrm>
           <a:prstGeom prst="roundRect">
             <a:avLst>
@@ -783,7 +783,7 @@
           <a:p>
             <a:pPr algn="ctr"/>
             <a:r>
-              <a:rPr lang="en-US" sz="900" b="1" dirty="0">
+              <a:rPr lang="en-US" sz="800" b="1" dirty="0">
                 <a:solidFill>
                   <a:schemeClr val="tx1"/>
                 </a:solidFill>
@@ -824,8 +824,8 @@
         </p:blipFill>
         <p:spPr>
           <a:xfrm>
-            <a:off x="10221168" y="2249937"/>
-            <a:ext cx="915178" cy="1307495"/>
+            <a:off x="9495901" y="2147591"/>
+            <a:ext cx="746348" cy="1066290"/>
           </a:xfrm>
           <a:prstGeom prst="rect">
             <a:avLst/>
@@ -846,8 +846,8 @@
         </p:nvSpPr>
         <p:spPr>
           <a:xfrm>
-            <a:off x="9036440" y="1695149"/>
-            <a:ext cx="897125" cy="283913"/>
+            <a:off x="8529731" y="1695149"/>
+            <a:ext cx="731625" cy="231537"/>
           </a:xfrm>
           <a:prstGeom prst="roundRect">
             <a:avLst>
@@ -883,7 +883,7 @@
           <a:p>
             <a:pPr algn="ctr"/>
             <a:r>
-              <a:rPr lang="en-US" sz="900" b="1" dirty="0">
+              <a:rPr lang="en-US" sz="800" b="1" dirty="0">
                 <a:solidFill>
                   <a:schemeClr val="tx1"/>
                 </a:solidFill>
@@ -924,8 +924,8 @@
         </p:blipFill>
         <p:spPr>
           <a:xfrm>
-            <a:off x="9027413" y="2249937"/>
-            <a:ext cx="915178" cy="1307495"/>
+            <a:off x="8522369" y="2147591"/>
+            <a:ext cx="746348" cy="1066290"/>
           </a:xfrm>
           <a:prstGeom prst="rect">
             <a:avLst/>
@@ -946,8 +946,8 @@
         </p:nvSpPr>
         <p:spPr>
           <a:xfrm>
-            <a:off x="2123849" y="1695149"/>
-            <a:ext cx="758486" cy="283913"/>
+            <a:off x="2892364" y="1695149"/>
+            <a:ext cx="618561" cy="231537"/>
           </a:xfrm>
           <a:prstGeom prst="roundRect">
             <a:avLst>
@@ -983,7 +983,7 @@
           <a:p>
             <a:pPr algn="ctr"/>
             <a:r>
-              <a:rPr lang="en-US" sz="900" b="1" dirty="0">
+              <a:rPr lang="en-US" sz="800" b="1" dirty="0">
                 <a:solidFill>
                   <a:schemeClr val="tx1"/>
                 </a:solidFill>
@@ -1024,8 +1024,8 @@
         </p:blipFill>
         <p:spPr>
           <a:xfrm>
-            <a:off x="2045503" y="2249937"/>
-            <a:ext cx="915178" cy="1307495"/>
+            <a:off x="2828470" y="2147591"/>
+            <a:ext cx="746348" cy="1066290"/>
           </a:xfrm>
           <a:prstGeom prst="rect">
             <a:avLst/>
@@ -1046,8 +1046,8 @@
         </p:nvSpPr>
         <p:spPr>
           <a:xfrm>
-            <a:off x="964939" y="1695149"/>
-            <a:ext cx="758486" cy="283913"/>
+            <a:off x="1947247" y="1695149"/>
+            <a:ext cx="618561" cy="231537"/>
           </a:xfrm>
           <a:prstGeom prst="roundRect">
             <a:avLst>
@@ -1083,7 +1083,7 @@
           <a:p>
             <a:pPr algn="ctr"/>
             <a:r>
-              <a:rPr lang="en-US" sz="900" b="1" dirty="0">
+              <a:rPr lang="en-US" sz="800" b="1" dirty="0">
                 <a:solidFill>
                   <a:schemeClr val="tx1"/>
                 </a:solidFill>
@@ -1124,8 +1124,8 @@
         </p:blipFill>
         <p:spPr>
           <a:xfrm>
-            <a:off x="886593" y="2249937"/>
-            <a:ext cx="915178" cy="1307495"/>
+            <a:off x="1883355" y="2147591"/>
+            <a:ext cx="746348" cy="1066290"/>
           </a:xfrm>
           <a:prstGeom prst="rect">
             <a:avLst/>
@@ -1146,8 +1146,8 @@
         </p:nvSpPr>
         <p:spPr>
           <a:xfrm>
-            <a:off x="3282759" y="1695149"/>
-            <a:ext cx="758486" cy="283913"/>
+            <a:off x="3837480" y="1695149"/>
+            <a:ext cx="618561" cy="231537"/>
           </a:xfrm>
           <a:prstGeom prst="roundRect">
             <a:avLst>
@@ -1183,7 +1183,7 @@
           <a:p>
             <a:pPr algn="ctr"/>
             <a:r>
-              <a:rPr lang="en-US" sz="900" b="1" dirty="0">
+              <a:rPr lang="en-US" sz="800" b="1" dirty="0">
                 <a:solidFill>
                   <a:schemeClr val="tx1"/>
                 </a:solidFill>
@@ -1224,8 +1224,8 @@
         </p:blipFill>
         <p:spPr>
           <a:xfrm>
-            <a:off x="3204413" y="2249937"/>
-            <a:ext cx="915178" cy="1307495"/>
+            <a:off x="3773587" y="2147591"/>
+            <a:ext cx="746348" cy="1066290"/>
           </a:xfrm>
           <a:prstGeom prst="rect">
             <a:avLst/>
@@ -1263,8 +1263,8 @@
         </p:blipFill>
         <p:spPr>
           <a:xfrm>
-            <a:off x="964940" y="3784525"/>
-            <a:ext cx="758485" cy="1527677"/>
+            <a:off x="1947248" y="3399080"/>
+            <a:ext cx="618561" cy="1245854"/>
           </a:xfrm>
           <a:prstGeom prst="rect">
             <a:avLst/>
@@ -1302,8 +1302,8 @@
         </p:blipFill>
         <p:spPr>
           <a:xfrm>
-            <a:off x="2123850" y="3784525"/>
-            <a:ext cx="758485" cy="1527677"/>
+            <a:off x="2892364" y="3399080"/>
+            <a:ext cx="618561" cy="1245854"/>
           </a:xfrm>
           <a:prstGeom prst="rect">
             <a:avLst/>
@@ -1341,8 +1341,8 @@
         </p:blipFill>
         <p:spPr>
           <a:xfrm>
-            <a:off x="3283052" y="3785113"/>
-            <a:ext cx="757901" cy="1526500"/>
+            <a:off x="3837719" y="3399560"/>
+            <a:ext cx="618084" cy="1244893"/>
           </a:xfrm>
           <a:prstGeom prst="rect">
             <a:avLst/>
@@ -1380,8 +1380,8 @@
         </p:blipFill>
         <p:spPr>
           <a:xfrm>
-            <a:off x="7872381" y="3785113"/>
-            <a:ext cx="757901" cy="1526500"/>
+            <a:off x="7580416" y="3399560"/>
+            <a:ext cx="618084" cy="1244893"/>
           </a:xfrm>
           <a:prstGeom prst="rect">
             <a:avLst/>
@@ -1419,8 +1419,8 @@
         </p:blipFill>
         <p:spPr>
           <a:xfrm>
-            <a:off x="10299807" y="3785113"/>
-            <a:ext cx="757900" cy="1526500"/>
+            <a:off x="9560034" y="3399560"/>
+            <a:ext cx="618084" cy="1244893"/>
           </a:xfrm>
           <a:prstGeom prst="rect">
             <a:avLst/>
@@ -1458,8 +1458,8 @@
         </p:blipFill>
         <p:spPr>
           <a:xfrm>
-            <a:off x="9106052" y="3785113"/>
-            <a:ext cx="757901" cy="1526500"/>
+            <a:off x="8586501" y="3399560"/>
+            <a:ext cx="618084" cy="1244893"/>
           </a:xfrm>
           <a:prstGeom prst="rect">
             <a:avLst/>
@@ -1494,8 +1494,8 @@
         </p:blipFill>
         <p:spPr>
           <a:xfrm>
-            <a:off x="6636014" y="2249888"/>
-            <a:ext cx="915246" cy="1307592"/>
+            <a:off x="6572131" y="2147551"/>
+            <a:ext cx="746403" cy="1066369"/>
           </a:xfrm>
           <a:prstGeom prst="rect">
             <a:avLst/>
@@ -1530,8 +1530,8 @@
         </p:blipFill>
         <p:spPr>
           <a:xfrm>
-            <a:off x="5497703" y="2249888"/>
-            <a:ext cx="915246" cy="1307592"/>
+            <a:off x="5643814" y="2147551"/>
+            <a:ext cx="746403" cy="1066369"/>
           </a:xfrm>
           <a:prstGeom prst="rect">
             <a:avLst/>
@@ -1566,8 +1566,8 @@
         </p:blipFill>
         <p:spPr>
           <a:xfrm>
-            <a:off x="4386688" y="2249888"/>
-            <a:ext cx="915246" cy="1307592"/>
+            <a:off x="4737758" y="2147551"/>
+            <a:ext cx="746403" cy="1066369"/>
           </a:xfrm>
           <a:prstGeom prst="rect">
             <a:avLst/>
@@ -1601,9 +1601,9 @@
           </a:stretch>
         </p:blipFill>
         <p:spPr>
-          <a:xfrm flipH="1">
-            <a:off x="6714464" y="3784664"/>
-            <a:ext cx="758347" cy="1527399"/>
+          <a:xfrm>
+            <a:off x="6636109" y="3399194"/>
+            <a:ext cx="618449" cy="1245627"/>
           </a:xfrm>
           <a:prstGeom prst="rect">
             <a:avLst/>
@@ -1637,9 +1637,9 @@
           </a:stretch>
         </p:blipFill>
         <p:spPr>
-          <a:xfrm flipH="1">
-            <a:off x="5576153" y="3784664"/>
-            <a:ext cx="758347" cy="1527399"/>
+          <a:xfrm>
+            <a:off x="5707792" y="3399194"/>
+            <a:ext cx="618449" cy="1245627"/>
           </a:xfrm>
           <a:prstGeom prst="rect">
             <a:avLst/>
@@ -1673,9 +1673,9 @@
           </a:stretch>
         </p:blipFill>
         <p:spPr>
-          <a:xfrm flipH="1">
-            <a:off x="4465138" y="3784664"/>
-            <a:ext cx="758347" cy="1527399"/>
+          <a:xfrm>
+            <a:off x="4801735" y="3399194"/>
+            <a:ext cx="618449" cy="1245627"/>
           </a:xfrm>
           <a:prstGeom prst="rect">
             <a:avLst/>
@@ -1696,8 +1696,8 @@
         </p:nvSpPr>
         <p:spPr>
           <a:xfrm>
-            <a:off x="6575463" y="1695149"/>
-            <a:ext cx="1036349" cy="283913"/>
+            <a:off x="6522751" y="1695149"/>
+            <a:ext cx="845165" cy="231537"/>
           </a:xfrm>
           <a:prstGeom prst="roundRect">
             <a:avLst>
@@ -1733,7 +1733,7 @@
           <a:p>
             <a:pPr algn="ctr"/>
             <a:r>
-              <a:rPr lang="en-US" sz="900" b="1" dirty="0">
+              <a:rPr lang="en-US" sz="800" b="1" dirty="0">
                 <a:solidFill>
                   <a:schemeClr val="tx1"/>
                 </a:solidFill>
@@ -1757,8 +1757,8 @@
         </p:nvSpPr>
         <p:spPr>
           <a:xfrm>
-            <a:off x="4437119" y="1695149"/>
-            <a:ext cx="814384" cy="283913"/>
+            <a:off x="4778885" y="1695149"/>
+            <a:ext cx="664147" cy="231537"/>
           </a:xfrm>
           <a:prstGeom prst="roundRect">
             <a:avLst>
@@ -1794,7 +1794,7 @@
           <a:p>
             <a:pPr algn="ctr"/>
             <a:r>
-              <a:rPr lang="en-US" sz="900" b="1" dirty="0">
+              <a:rPr lang="en-US" sz="800" b="1" dirty="0">
                 <a:solidFill>
                   <a:schemeClr val="tx1"/>
                 </a:solidFill>
@@ -1818,8 +1818,8 @@
         </p:nvSpPr>
         <p:spPr>
           <a:xfrm>
-            <a:off x="5437152" y="1695149"/>
-            <a:ext cx="1036349" cy="283913"/>
+            <a:off x="5594433" y="1695149"/>
+            <a:ext cx="845165" cy="231537"/>
           </a:xfrm>
           <a:prstGeom prst="roundRect">
             <a:avLst>
@@ -1855,7 +1855,7 @@
           <a:p>
             <a:pPr algn="ctr"/>
             <a:r>
-              <a:rPr lang="en-US" sz="900" b="1" dirty="0">
+              <a:rPr lang="en-US" sz="800" b="1" dirty="0">
                 <a:solidFill>
                   <a:schemeClr val="tx1"/>
                 </a:solidFill>
@@ -1865,6 +1865,139 @@
           </a:p>
         </p:txBody>
       </p:sp>
+      <p:sp>
+        <p:nvSpPr>
+          <p:cNvPr id="32" name="Rounded Rectangle 31">
+            <a:extLst>
+              <a:ext uri="{FF2B5EF4-FFF2-40B4-BE49-F238E27FC236}">
+                <a16:creationId xmlns:a16="http://schemas.microsoft.com/office/drawing/2014/main" id="{3F1C33E3-661D-6746-B8F7-18F339CB6BA9}"/>
+              </a:ext>
+            </a:extLst>
+          </p:cNvPr>
+          <p:cNvSpPr/>
+          <p:nvPr/>
+        </p:nvSpPr>
+        <p:spPr>
+          <a:xfrm>
+            <a:off x="945599" y="1695149"/>
+            <a:ext cx="731625" cy="231537"/>
+          </a:xfrm>
+          <a:prstGeom prst="roundRect">
+            <a:avLst>
+              <a:gd name="adj" fmla="val 50000"/>
+            </a:avLst>
+          </a:prstGeom>
+          <a:solidFill>
+            <a:schemeClr val="bg1"/>
+          </a:solidFill>
+          <a:ln>
+            <a:noFill/>
+          </a:ln>
+        </p:spPr>
+        <p:style>
+          <a:lnRef idx="2">
+            <a:schemeClr val="accent1">
+              <a:shade val="50000"/>
+            </a:schemeClr>
+          </a:lnRef>
+          <a:fillRef idx="1">
+            <a:schemeClr val="accent1"/>
+          </a:fillRef>
+          <a:effectRef idx="0">
+            <a:schemeClr val="accent1"/>
+          </a:effectRef>
+          <a:fontRef idx="minor">
+            <a:schemeClr val="lt1"/>
+          </a:fontRef>
+        </p:style>
+        <p:txBody>
+          <a:bodyPr lIns="0" tIns="0" rIns="0" bIns="0" rtlCol="0" anchor="ctr"/>
+          <a:lstStyle/>
+          <a:p>
+            <a:pPr algn="ctr"/>
+            <a:r>
+              <a:rPr lang="en-US" sz="800" b="1" dirty="0">
+                <a:solidFill>
+                  <a:schemeClr val="tx1"/>
+                </a:solidFill>
+              </a:rPr>
+              <a:t>Hero</a:t>
+            </a:r>
+          </a:p>
+        </p:txBody>
+      </p:sp>
+      <p:pic>
+        <p:nvPicPr>
+          <p:cNvPr id="8" name="Graphic 7">
+            <a:extLst>
+              <a:ext uri="{FF2B5EF4-FFF2-40B4-BE49-F238E27FC236}">
+                <a16:creationId xmlns:a16="http://schemas.microsoft.com/office/drawing/2014/main" id="{1914CFBF-A800-9D43-88E2-DBFDA2BCC62F}"/>
+              </a:ext>
+            </a:extLst>
+          </p:cNvPr>
+          <p:cNvPicPr>
+            <a:picLocks noChangeAspect="1"/>
+          </p:cNvPicPr>
+          <p:nvPr/>
+        </p:nvPicPr>
+        <p:blipFill>
+          <a:blip r:embed="rId38">
+            <a:extLst>
+              <a:ext uri="{96DAC541-7B7A-43D3-8B79-37D633B846F1}">
+                <asvg:svgBlip xmlns:asvg="http://schemas.microsoft.com/office/drawing/2016/SVG/main" r:embed="rId39"/>
+              </a:ext>
+            </a:extLst>
+          </a:blip>
+          <a:stretch>
+            <a:fillRect/>
+          </a:stretch>
+        </p:blipFill>
+        <p:spPr>
+          <a:xfrm>
+            <a:off x="938238" y="2147551"/>
+            <a:ext cx="746348" cy="1066290"/>
+          </a:xfrm>
+          <a:prstGeom prst="rect">
+            <a:avLst/>
+          </a:prstGeom>
+        </p:spPr>
+      </p:pic>
+      <p:pic>
+        <p:nvPicPr>
+          <p:cNvPr id="14" name="Graphic 13">
+            <a:extLst>
+              <a:ext uri="{FF2B5EF4-FFF2-40B4-BE49-F238E27FC236}">
+                <a16:creationId xmlns:a16="http://schemas.microsoft.com/office/drawing/2014/main" id="{73DDED6D-7A17-114B-9F6D-8A0795A6826C}"/>
+              </a:ext>
+            </a:extLst>
+          </p:cNvPr>
+          <p:cNvPicPr>
+            <a:picLocks noChangeAspect="1"/>
+          </p:cNvPicPr>
+          <p:nvPr/>
+        </p:nvPicPr>
+        <p:blipFill>
+          <a:blip r:embed="rId40">
+            <a:extLst>
+              <a:ext uri="{96DAC541-7B7A-43D3-8B79-37D633B846F1}">
+                <asvg:svgBlip xmlns:asvg="http://schemas.microsoft.com/office/drawing/2016/SVG/main" r:embed="rId41"/>
+              </a:ext>
+            </a:extLst>
+          </a:blip>
+          <a:stretch>
+            <a:fillRect/>
+          </a:stretch>
+        </p:blipFill>
+        <p:spPr>
+          <a:xfrm>
+            <a:off x="1002131" y="3398599"/>
+            <a:ext cx="618561" cy="1245855"/>
+          </a:xfrm>
+          <a:prstGeom prst="rect">
+            <a:avLst/>
+          </a:prstGeom>
+        </p:spPr>
+      </p:pic>
     </p:spTree>
     <p:extLst>
       <p:ext uri="{BB962C8B-B14F-4D97-AF65-F5344CB8AC3E}">

</xml_diff>